<commit_message>
commit on the log mechanism
</commit_message>
<xml_diff>
--- a/MMI513-TermProjectPresentation.pptx
+++ b/MMI513-TermProjectPresentation.pptx
@@ -114,6 +114,11 @@
       </a:defRPr>
     </a:lvl9pPr>
   </p:defaultTextStyle>
+  <p:extLst>
+    <p:ext uri="{EFAFB233-063F-42B5-8137-9DF3F51BA10A}">
+      <p15:sldGuideLst xmlns:p15="http://schemas.microsoft.com/office/powerpoint/2012/main"/>
+    </p:ext>
+  </p:extLst>
 </p:presentation>
 </file>
 
@@ -3175,6 +3180,127 @@
           </a:bodyPr>
           <a:lstStyle/>
           <a:p>
+            <a:pPr marL="342900" indent="-342900" algn="l">
+              <a:lnSpc>
+                <a:spcPct val="107000"/>
+              </a:lnSpc>
+              <a:spcAft>
+                <a:spcPts val="800"/>
+              </a:spcAft>
+              <a:buFont typeface="Wingdings" panose="05000000000000000000" pitchFamily="2" charset="2"/>
+              <a:buChar char="Ø"/>
+            </a:pPr>
+            <a:r>
+              <a:rPr lang="en-US" sz="1800" dirty="0">
+                <a:latin typeface="Calibri" panose="020F0502020204030204" pitchFamily="34" charset="0"/>
+                <a:cs typeface="Times New Roman" panose="02020603050405020304" pitchFamily="18" charset="0"/>
+              </a:rPr>
+              <a:t>The </a:t>
+            </a:r>
+            <a:r>
+              <a:rPr lang="tr-TR" sz="1800" dirty="0">
+                <a:latin typeface="Calibri" panose="020F0502020204030204" pitchFamily="34" charset="0"/>
+                <a:cs typeface="Times New Roman" panose="02020603050405020304" pitchFamily="18" charset="0"/>
+              </a:rPr>
+              <a:t>game has the parameters of the game:</a:t>
+            </a:r>
+          </a:p>
+          <a:p>
+            <a:pPr marL="800100" lvl="1" indent="-342900" algn="l">
+              <a:lnSpc>
+                <a:spcPct val="107000"/>
+              </a:lnSpc>
+              <a:spcAft>
+                <a:spcPts val="800"/>
+              </a:spcAft>
+              <a:buFont typeface="Wingdings" panose="05000000000000000000" pitchFamily="2" charset="2"/>
+              <a:buChar char="Ø"/>
+            </a:pPr>
+            <a:r>
+              <a:rPr lang="tr-TR" sz="1400" dirty="0">
+                <a:latin typeface="Calibri" panose="020F0502020204030204" pitchFamily="34" charset="0"/>
+                <a:cs typeface="Times New Roman" panose="02020603050405020304" pitchFamily="18" charset="0"/>
+              </a:rPr>
+              <a:t>Power Up Count: 7</a:t>
+            </a:r>
+          </a:p>
+          <a:p>
+            <a:pPr marL="800100" lvl="1" indent="-342900" algn="l">
+              <a:lnSpc>
+                <a:spcPct val="107000"/>
+              </a:lnSpc>
+              <a:spcAft>
+                <a:spcPts val="800"/>
+              </a:spcAft>
+              <a:buFont typeface="Wingdings" panose="05000000000000000000" pitchFamily="2" charset="2"/>
+              <a:buChar char="Ø"/>
+            </a:pPr>
+            <a:r>
+              <a:rPr lang="tr-TR" sz="1400" dirty="0">
+                <a:latin typeface="Calibri" panose="020F0502020204030204" pitchFamily="34" charset="0"/>
+                <a:cs typeface="Times New Roman" panose="02020603050405020304" pitchFamily="18" charset="0"/>
+              </a:rPr>
+              <a:t>Portal Gate Count: 5</a:t>
+            </a:r>
+          </a:p>
+          <a:p>
+            <a:pPr marL="800100" lvl="1" indent="-342900" algn="l">
+              <a:lnSpc>
+                <a:spcPct val="107000"/>
+              </a:lnSpc>
+              <a:spcAft>
+                <a:spcPts val="800"/>
+              </a:spcAft>
+              <a:buFont typeface="Wingdings" panose="05000000000000000000" pitchFamily="2" charset="2"/>
+              <a:buChar char="Ø"/>
+            </a:pPr>
+            <a:r>
+              <a:rPr lang="tr-TR" sz="1400" dirty="0">
+                <a:latin typeface="Calibri" panose="020F0502020204030204" pitchFamily="34" charset="0"/>
+                <a:cs typeface="Times New Roman" panose="02020603050405020304" pitchFamily="18" charset="0"/>
+              </a:rPr>
+              <a:t>Map Size: 29x26</a:t>
+            </a:r>
+          </a:p>
+          <a:p>
+            <a:pPr marL="800100" lvl="1" indent="-342900" algn="l">
+              <a:lnSpc>
+                <a:spcPct val="107000"/>
+              </a:lnSpc>
+              <a:spcAft>
+                <a:spcPts val="800"/>
+              </a:spcAft>
+              <a:buFont typeface="Wingdings" panose="05000000000000000000" pitchFamily="2" charset="2"/>
+              <a:buChar char="Ø"/>
+            </a:pPr>
+            <a:r>
+              <a:rPr lang="tr-TR" sz="1400" dirty="0">
+                <a:latin typeface="Calibri" panose="020F0502020204030204" pitchFamily="34" charset="0"/>
+                <a:cs typeface="Times New Roman" panose="02020603050405020304" pitchFamily="18" charset="0"/>
+              </a:rPr>
+              <a:t>Ghost Spawn Frequency: 60</a:t>
+            </a:r>
+          </a:p>
+          <a:p>
+            <a:pPr marL="800100" lvl="1" indent="-342900" algn="l">
+              <a:lnSpc>
+                <a:spcPct val="107000"/>
+              </a:lnSpc>
+              <a:spcAft>
+                <a:spcPts val="800"/>
+              </a:spcAft>
+              <a:buFont typeface="Wingdings" panose="05000000000000000000" pitchFamily="2" charset="2"/>
+              <a:buChar char="Ø"/>
+            </a:pPr>
+            <a:r>
+              <a:rPr lang="tr-TR" sz="1400" dirty="0">
+                <a:latin typeface="Calibri" panose="020F0502020204030204" pitchFamily="34" charset="0"/>
+                <a:cs typeface="Times New Roman" panose="02020603050405020304" pitchFamily="18" charset="0"/>
+              </a:rPr>
+              <a:t>Manhattan Distance Limit: 10</a:t>
+            </a:r>
+          </a:p>
+          <a:p>
             <a:pPr algn="l"/>
             <a:endParaRPr lang="en-GB" sz="2800" dirty="0">
               <a:latin typeface="Tw Cen MT" panose="020B0602020104020603" pitchFamily="34" charset="0"/>
@@ -3182,6 +3308,66 @@
           </a:p>
         </p:txBody>
       </p:sp>
+      <p:pic>
+        <p:nvPicPr>
+          <p:cNvPr id="4" name="Picture 3">
+            <a:extLst>
+              <a:ext uri="{FF2B5EF4-FFF2-40B4-BE49-F238E27FC236}">
+                <a16:creationId xmlns:a16="http://schemas.microsoft.com/office/drawing/2014/main" id="{710B5DE6-7A2E-8E38-A7C5-AC9678C3E17B}"/>
+              </a:ext>
+            </a:extLst>
+          </p:cNvPr>
+          <p:cNvPicPr>
+            <a:picLocks noChangeAspect="1"/>
+          </p:cNvPicPr>
+          <p:nvPr/>
+        </p:nvPicPr>
+        <p:blipFill>
+          <a:blip r:embed="rId3"/>
+          <a:stretch>
+            <a:fillRect/>
+          </a:stretch>
+        </p:blipFill>
+        <p:spPr>
+          <a:xfrm>
+            <a:off x="1524000" y="4301527"/>
+            <a:ext cx="4387876" cy="2021593"/>
+          </a:xfrm>
+          <a:prstGeom prst="rect">
+            <a:avLst/>
+          </a:prstGeom>
+        </p:spPr>
+      </p:pic>
+      <p:pic>
+        <p:nvPicPr>
+          <p:cNvPr id="8" name="Picture 7">
+            <a:extLst>
+              <a:ext uri="{FF2B5EF4-FFF2-40B4-BE49-F238E27FC236}">
+                <a16:creationId xmlns:a16="http://schemas.microsoft.com/office/drawing/2014/main" id="{C3837758-A07C-32B1-CCFA-614B7F6F12F2}"/>
+              </a:ext>
+            </a:extLst>
+          </p:cNvPr>
+          <p:cNvPicPr>
+            <a:picLocks noChangeAspect="1"/>
+          </p:cNvPicPr>
+          <p:nvPr/>
+        </p:nvPicPr>
+        <p:blipFill>
+          <a:blip r:embed="rId4"/>
+          <a:stretch>
+            <a:fillRect/>
+          </a:stretch>
+        </p:blipFill>
+        <p:spPr>
+          <a:xfrm>
+            <a:off x="7356953" y="1238226"/>
+            <a:ext cx="4562475" cy="3459702"/>
+          </a:xfrm>
+          <a:prstGeom prst="rect">
+            <a:avLst/>
+          </a:prstGeom>
+        </p:spPr>
+      </p:pic>
     </p:spTree>
     <p:extLst>
       <p:ext uri="{BB962C8B-B14F-4D97-AF65-F5344CB8AC3E}">
@@ -3294,7 +3480,259 @@
           </a:bodyPr>
           <a:lstStyle/>
           <a:p>
+            <a:pPr marL="342900" indent="-342900" algn="l">
+              <a:lnSpc>
+                <a:spcPct val="107000"/>
+              </a:lnSpc>
+              <a:spcAft>
+                <a:spcPts val="800"/>
+              </a:spcAft>
+              <a:buFont typeface="Wingdings" panose="05000000000000000000" pitchFamily="2" charset="2"/>
+              <a:buChar char="Ø"/>
+            </a:pPr>
+            <a:r>
+              <a:rPr lang="tr-TR" sz="1800" dirty="0">
+                <a:latin typeface="Calibri" panose="020F0502020204030204" pitchFamily="34" charset="0"/>
+                <a:cs typeface="Times New Roman" panose="02020603050405020304" pitchFamily="18" charset="0"/>
+              </a:rPr>
+              <a:t>With this term project, we have experimented with the implementation of the algorithms covered during this course. </a:t>
+            </a:r>
+            <a:endParaRPr lang="tr-TR" sz="1800" dirty="0">
+              <a:latin typeface="Calibri" panose="020F0502020204030204" pitchFamily="34" charset="0"/>
+              <a:ea typeface="Calibri" panose="020F0502020204030204" pitchFamily="34" charset="0"/>
+              <a:cs typeface="Times New Roman" panose="02020603050405020304" pitchFamily="18" charset="0"/>
+            </a:endParaRPr>
+          </a:p>
+          <a:p>
+            <a:pPr marL="342900" indent="-342900" algn="l">
+              <a:lnSpc>
+                <a:spcPct val="107000"/>
+              </a:lnSpc>
+              <a:spcAft>
+                <a:spcPts val="800"/>
+              </a:spcAft>
+              <a:buFont typeface="Wingdings" panose="05000000000000000000" pitchFamily="2" charset="2"/>
+              <a:buChar char="Ø"/>
+            </a:pPr>
+            <a:r>
+              <a:rPr lang="tr-TR" sz="1800" dirty="0">
+                <a:latin typeface="Calibri" panose="020F0502020204030204" pitchFamily="34" charset="0"/>
+                <a:cs typeface="Times New Roman" panose="02020603050405020304" pitchFamily="18" charset="0"/>
+              </a:rPr>
+              <a:t>With our</a:t>
+            </a:r>
+            <a:r>
+              <a:rPr lang="en-US" sz="1800" dirty="0">
+                <a:latin typeface="Calibri" panose="020F0502020204030204" pitchFamily="34" charset="0"/>
+                <a:cs typeface="Times New Roman" panose="02020603050405020304" pitchFamily="18" charset="0"/>
+              </a:rPr>
+              <a:t> enhancements</a:t>
+            </a:r>
+            <a:r>
+              <a:rPr lang="tr-TR" sz="1800" dirty="0">
+                <a:latin typeface="Calibri" panose="020F0502020204030204" pitchFamily="34" charset="0"/>
+                <a:cs typeface="Times New Roman" panose="02020603050405020304" pitchFamily="18" charset="0"/>
+              </a:rPr>
+              <a:t>, </a:t>
+            </a:r>
+            <a:r>
+              <a:rPr lang="en-US" sz="1800" dirty="0">
+                <a:latin typeface="Calibri" panose="020F0502020204030204" pitchFamily="34" charset="0"/>
+                <a:cs typeface="Times New Roman" panose="02020603050405020304" pitchFamily="18" charset="0"/>
+              </a:rPr>
+              <a:t>the classic Pac-Man game</a:t>
+            </a:r>
+            <a:r>
+              <a:rPr lang="tr-TR" sz="1800" dirty="0">
+                <a:latin typeface="Calibri" panose="020F0502020204030204" pitchFamily="34" charset="0"/>
+                <a:cs typeface="Times New Roman" panose="02020603050405020304" pitchFamily="18" charset="0"/>
+              </a:rPr>
+              <a:t> was</a:t>
+            </a:r>
+            <a:r>
+              <a:rPr lang="en-US" sz="1800" dirty="0">
+                <a:latin typeface="Calibri" panose="020F0502020204030204" pitchFamily="34" charset="0"/>
+                <a:cs typeface="Times New Roman" panose="02020603050405020304" pitchFamily="18" charset="0"/>
+              </a:rPr>
+              <a:t> transform</a:t>
+            </a:r>
+            <a:r>
+              <a:rPr lang="tr-TR" sz="1800" dirty="0">
+                <a:latin typeface="Calibri" panose="020F0502020204030204" pitchFamily="34" charset="0"/>
+                <a:cs typeface="Times New Roman" panose="02020603050405020304" pitchFamily="18" charset="0"/>
+              </a:rPr>
+              <a:t>ed</a:t>
+            </a:r>
+            <a:r>
+              <a:rPr lang="en-US" sz="1800" dirty="0">
+                <a:latin typeface="Calibri" panose="020F0502020204030204" pitchFamily="34" charset="0"/>
+                <a:cs typeface="Times New Roman" panose="02020603050405020304" pitchFamily="18" charset="0"/>
+              </a:rPr>
+              <a:t> into a more challenging and engaging experience</a:t>
+            </a:r>
+            <a:r>
+              <a:rPr lang="tr-TR" sz="1800" dirty="0">
+                <a:latin typeface="Calibri" panose="020F0502020204030204" pitchFamily="34" charset="0"/>
+                <a:cs typeface="Times New Roman" panose="02020603050405020304" pitchFamily="18" charset="0"/>
+              </a:rPr>
+              <a:t> by gaining the abilities of:</a:t>
+            </a:r>
+            <a:r>
+              <a:rPr lang="en-US" sz="1800" dirty="0">
+                <a:latin typeface="Calibri" panose="020F0502020204030204" pitchFamily="34" charset="0"/>
+                <a:cs typeface="Times New Roman" panose="02020603050405020304" pitchFamily="18" charset="0"/>
+              </a:rPr>
+              <a:t> </a:t>
+            </a:r>
+            <a:endParaRPr lang="tr-TR" sz="1800" dirty="0">
+              <a:latin typeface="Calibri" panose="020F0502020204030204" pitchFamily="34" charset="0"/>
+              <a:cs typeface="Times New Roman" panose="02020603050405020304" pitchFamily="18" charset="0"/>
+            </a:endParaRPr>
+          </a:p>
+          <a:p>
+            <a:pPr marL="742950" lvl="1" indent="-285750" algn="l">
+              <a:buFont typeface="Arial" panose="020B0604020202020204" pitchFamily="34" charset="0"/>
+              <a:buChar char="•"/>
+            </a:pPr>
+            <a:r>
+              <a:rPr lang="tr-TR" sz="1600" dirty="0">
+                <a:latin typeface="Calibri" panose="020F0502020204030204" pitchFamily="34" charset="0"/>
+                <a:ea typeface="Calibri" panose="020F0502020204030204" pitchFamily="34" charset="0"/>
+                <a:cs typeface="Times New Roman" panose="02020603050405020304" pitchFamily="18" charset="0"/>
+              </a:rPr>
+              <a:t>T</a:t>
+            </a:r>
+            <a:r>
+              <a:rPr lang="en-US" sz="1600" dirty="0">
+                <a:effectLst/>
+                <a:latin typeface="Calibri" panose="020F0502020204030204" pitchFamily="34" charset="0"/>
+                <a:ea typeface="Calibri" panose="020F0502020204030204" pitchFamily="34" charset="0"/>
+                <a:cs typeface="Times New Roman" panose="02020603050405020304" pitchFamily="18" charset="0"/>
+              </a:rPr>
+              <a:t>he integration of dynamic maze generation</a:t>
+            </a:r>
+            <a:endParaRPr lang="tr-TR" sz="1600" dirty="0">
+              <a:effectLst/>
+              <a:latin typeface="Calibri" panose="020F0502020204030204" pitchFamily="34" charset="0"/>
+              <a:ea typeface="Calibri" panose="020F0502020204030204" pitchFamily="34" charset="0"/>
+              <a:cs typeface="Times New Roman" panose="02020603050405020304" pitchFamily="18" charset="0"/>
+            </a:endParaRPr>
+          </a:p>
+          <a:p>
+            <a:pPr marL="742950" lvl="1" indent="-285750" algn="l">
+              <a:buFont typeface="Arial" panose="020B0604020202020204" pitchFamily="34" charset="0"/>
+              <a:buChar char="•"/>
+            </a:pPr>
+            <a:r>
+              <a:rPr lang="en-US" sz="1600" dirty="0">
+                <a:effectLst/>
+                <a:latin typeface="Calibri" panose="020F0502020204030204" pitchFamily="34" charset="0"/>
+                <a:ea typeface="Calibri" panose="020F0502020204030204" pitchFamily="34" charset="0"/>
+                <a:cs typeface="Times New Roman" panose="02020603050405020304" pitchFamily="18" charset="0"/>
+              </a:rPr>
+              <a:t>Strategy-</a:t>
+            </a:r>
+            <a:r>
+              <a:rPr lang="tr-TR" sz="1600" dirty="0">
+                <a:effectLst/>
+                <a:latin typeface="Calibri" panose="020F0502020204030204" pitchFamily="34" charset="0"/>
+                <a:ea typeface="Calibri" panose="020F0502020204030204" pitchFamily="34" charset="0"/>
+                <a:cs typeface="Times New Roman" panose="02020603050405020304" pitchFamily="18" charset="0"/>
+              </a:rPr>
+              <a:t> and </a:t>
+            </a:r>
+            <a:r>
+              <a:rPr lang="en-US" sz="1600" dirty="0">
+                <a:effectLst/>
+                <a:latin typeface="Calibri" panose="020F0502020204030204" pitchFamily="34" charset="0"/>
+                <a:ea typeface="Calibri" panose="020F0502020204030204" pitchFamily="34" charset="0"/>
+                <a:cs typeface="Times New Roman" panose="02020603050405020304" pitchFamily="18" charset="0"/>
+              </a:rPr>
+              <a:t>Tactical</a:t>
+            </a:r>
+            <a:r>
+              <a:rPr lang="tr-TR" sz="1600" dirty="0">
+                <a:effectLst/>
+                <a:latin typeface="Calibri" panose="020F0502020204030204" pitchFamily="34" charset="0"/>
+                <a:ea typeface="Calibri" panose="020F0502020204030204" pitchFamily="34" charset="0"/>
+                <a:cs typeface="Times New Roman" panose="02020603050405020304" pitchFamily="18" charset="0"/>
+              </a:rPr>
+              <a:t> </a:t>
+            </a:r>
+            <a:r>
+              <a:rPr lang="en-US" sz="1600" dirty="0">
+                <a:effectLst/>
+                <a:latin typeface="Calibri" panose="020F0502020204030204" pitchFamily="34" charset="0"/>
+                <a:ea typeface="Calibri" panose="020F0502020204030204" pitchFamily="34" charset="0"/>
+                <a:cs typeface="Times New Roman" panose="02020603050405020304" pitchFamily="18" charset="0"/>
+              </a:rPr>
+              <a:t>AI</a:t>
+            </a:r>
+            <a:r>
+              <a:rPr lang="tr-TR" sz="1600" dirty="0">
+                <a:effectLst/>
+                <a:latin typeface="Calibri" panose="020F0502020204030204" pitchFamily="34" charset="0"/>
+                <a:ea typeface="Calibri" panose="020F0502020204030204" pitchFamily="34" charset="0"/>
+                <a:cs typeface="Times New Roman" panose="02020603050405020304" pitchFamily="18" charset="0"/>
+              </a:rPr>
+              <a:t> behaviors for the Ghost</a:t>
+            </a:r>
+            <a:r>
+              <a:rPr lang="en-US" sz="1600" dirty="0">
+                <a:effectLst/>
+                <a:latin typeface="Calibri" panose="020F0502020204030204" pitchFamily="34" charset="0"/>
+                <a:ea typeface="Calibri" panose="020F0502020204030204" pitchFamily="34" charset="0"/>
+                <a:cs typeface="Times New Roman" panose="02020603050405020304" pitchFamily="18" charset="0"/>
+              </a:rPr>
+              <a:t> </a:t>
+            </a:r>
+            <a:endParaRPr lang="tr-TR" sz="1600" dirty="0">
+              <a:effectLst/>
+              <a:latin typeface="Calibri" panose="020F0502020204030204" pitchFamily="34" charset="0"/>
+              <a:ea typeface="Calibri" panose="020F0502020204030204" pitchFamily="34" charset="0"/>
+              <a:cs typeface="Times New Roman" panose="02020603050405020304" pitchFamily="18" charset="0"/>
+            </a:endParaRPr>
+          </a:p>
+          <a:p>
+            <a:pPr marL="742950" lvl="1" indent="-285750" algn="l">
+              <a:buFont typeface="Arial" panose="020B0604020202020204" pitchFamily="34" charset="0"/>
+              <a:buChar char="•"/>
+            </a:pPr>
+            <a:r>
+              <a:rPr lang="en-US" sz="1600" dirty="0">
+                <a:effectLst/>
+                <a:latin typeface="Calibri" panose="020F0502020204030204" pitchFamily="34" charset="0"/>
+                <a:ea typeface="Calibri" panose="020F0502020204030204" pitchFamily="34" charset="0"/>
+                <a:cs typeface="Times New Roman" panose="02020603050405020304" pitchFamily="18" charset="0"/>
+              </a:rPr>
+              <a:t>Analytics module </a:t>
+            </a:r>
+            <a:r>
+              <a:rPr lang="tr-TR" sz="1600" dirty="0">
+                <a:latin typeface="Calibri" panose="020F0502020204030204" pitchFamily="34" charset="0"/>
+                <a:ea typeface="Calibri" panose="020F0502020204030204" pitchFamily="34" charset="0"/>
+                <a:cs typeface="Times New Roman" panose="02020603050405020304" pitchFamily="18" charset="0"/>
+              </a:rPr>
+              <a:t>which can help investigate the effect of the parameters on gameplay</a:t>
+            </a:r>
+            <a:endParaRPr lang="tr-TR" sz="1600" dirty="0">
+              <a:effectLst/>
+              <a:latin typeface="Calibri" panose="020F0502020204030204" pitchFamily="34" charset="0"/>
+              <a:ea typeface="Calibri" panose="020F0502020204030204" pitchFamily="34" charset="0"/>
+              <a:cs typeface="Times New Roman" panose="02020603050405020304" pitchFamily="18" charset="0"/>
+            </a:endParaRPr>
+          </a:p>
+          <a:p>
             <a:pPr algn="l"/>
+            <a:r>
+              <a:rPr lang="tr-TR" sz="1800" dirty="0">
+                <a:effectLst/>
+                <a:latin typeface="Calibri" panose="020F0502020204030204" pitchFamily="34" charset="0"/>
+                <a:ea typeface="Calibri" panose="020F0502020204030204" pitchFamily="34" charset="0"/>
+                <a:cs typeface="Times New Roman" panose="02020603050405020304" pitchFamily="18" charset="0"/>
+              </a:rPr>
+              <a:t>	</a:t>
+            </a:r>
             <a:endParaRPr lang="en-GB" sz="2800" dirty="0">
               <a:latin typeface="Tw Cen MT" panose="020B0602020104020603" pitchFamily="34" charset="0"/>
             </a:endParaRPr>
@@ -6738,7 +7176,7 @@
               <a:buChar char="Ø"/>
             </a:pPr>
             <a:r>
-              <a:rPr lang="tr-TR" sz="1800">
+              <a:rPr lang="tr-TR" sz="1800" dirty="0">
                 <a:effectLst/>
                 <a:latin typeface="Calibri" panose="020F0502020204030204" pitchFamily="34" charset="0"/>
                 <a:ea typeface="Calibri" panose="020F0502020204030204" pitchFamily="34" charset="0"/>
@@ -6888,6 +7326,126 @@
           </a:bodyPr>
           <a:lstStyle/>
           <a:p>
+            <a:pPr lvl="1" algn="l"/>
+            <a:r>
+              <a:rPr lang="tr-TR" sz="2400" dirty="0">
+                <a:latin typeface="Tw Cen MT" panose="020B0602020104020603" pitchFamily="34" charset="0"/>
+              </a:rPr>
+              <a:t>Workflow of Strategy-AI</a:t>
+            </a:r>
+          </a:p>
+          <a:p>
+            <a:pPr marL="342900" lvl="0" indent="-342900" algn="l">
+              <a:lnSpc>
+                <a:spcPct val="107000"/>
+              </a:lnSpc>
+              <a:buFont typeface="Wingdings" panose="05000000000000000000" pitchFamily="2" charset="2"/>
+              <a:buChar char="Ø"/>
+            </a:pPr>
+            <a:r>
+              <a:rPr lang="en-US" sz="1800" dirty="0">
+                <a:latin typeface="Calibri" panose="020F0502020204030204" pitchFamily="34" charset="0"/>
+                <a:cs typeface="Times New Roman" panose="02020603050405020304" pitchFamily="18" charset="0"/>
+              </a:rPr>
+              <a:t>The placement for spawn locations of the ghosts is generated for </a:t>
+            </a:r>
+            <a:r>
+              <a:rPr lang="tr-TR" sz="1800" dirty="0">
+                <a:latin typeface="Calibri" panose="020F0502020204030204" pitchFamily="34" charset="0"/>
+                <a:cs typeface="Times New Roman" panose="02020603050405020304" pitchFamily="18" charset="0"/>
+              </a:rPr>
+              <a:t>diverse</a:t>
+            </a:r>
+            <a:r>
+              <a:rPr lang="en-US" sz="1800" dirty="0">
+                <a:latin typeface="Calibri" panose="020F0502020204030204" pitchFamily="34" charset="0"/>
+                <a:cs typeface="Times New Roman" panose="02020603050405020304" pitchFamily="18" charset="0"/>
+              </a:rPr>
+              <a:t> locations of the players and mazes. </a:t>
+            </a:r>
+            <a:endParaRPr lang="tr-TR" sz="1800" dirty="0">
+              <a:latin typeface="Calibri" panose="020F0502020204030204" pitchFamily="34" charset="0"/>
+              <a:cs typeface="Times New Roman" panose="02020603050405020304" pitchFamily="18" charset="0"/>
+            </a:endParaRPr>
+          </a:p>
+          <a:p>
+            <a:pPr marL="342900" lvl="0" indent="-342900" algn="l">
+              <a:lnSpc>
+                <a:spcPct val="107000"/>
+              </a:lnSpc>
+              <a:buFont typeface="Wingdings" panose="05000000000000000000" pitchFamily="2" charset="2"/>
+              <a:buChar char="Ø"/>
+            </a:pPr>
+            <a:r>
+              <a:rPr lang="en-US" sz="1800" dirty="0">
+                <a:latin typeface="Calibri" panose="020F0502020204030204" pitchFamily="34" charset="0"/>
+                <a:cs typeface="Times New Roman" panose="02020603050405020304" pitchFamily="18" charset="0"/>
+              </a:rPr>
+              <a:t>Difficulty level can be arranged strategically by setting ghost spawn distance</a:t>
+            </a:r>
+            <a:r>
+              <a:rPr lang="tr-TR" sz="1800" dirty="0">
+                <a:latin typeface="Calibri" panose="020F0502020204030204" pitchFamily="34" charset="0"/>
+                <a:cs typeface="Times New Roman" panose="02020603050405020304" pitchFamily="18" charset="0"/>
+              </a:rPr>
+              <a:t>, which was set as 10</a:t>
+            </a:r>
+            <a:r>
+              <a:rPr lang="en-US" sz="1800" dirty="0">
+                <a:latin typeface="Calibri" panose="020F0502020204030204" pitchFamily="34" charset="0"/>
+                <a:cs typeface="Times New Roman" panose="02020603050405020304" pitchFamily="18" charset="0"/>
+              </a:rPr>
+              <a:t>.</a:t>
+            </a:r>
+            <a:endParaRPr lang="tr-TR" sz="1800" dirty="0">
+              <a:latin typeface="Calibri" panose="020F0502020204030204" pitchFamily="34" charset="0"/>
+              <a:cs typeface="Times New Roman" panose="02020603050405020304" pitchFamily="18" charset="0"/>
+            </a:endParaRPr>
+          </a:p>
+          <a:p>
+            <a:pPr marL="342900" lvl="0" indent="-342900" algn="l">
+              <a:lnSpc>
+                <a:spcPct val="107000"/>
+              </a:lnSpc>
+              <a:buFont typeface="Wingdings" panose="05000000000000000000" pitchFamily="2" charset="2"/>
+              <a:buChar char="Ø"/>
+            </a:pPr>
+            <a:r>
+              <a:rPr lang="en-US" sz="1800" dirty="0">
+                <a:latin typeface="Calibri" panose="020F0502020204030204" pitchFamily="34" charset="0"/>
+                <a:cs typeface="Times New Roman" panose="02020603050405020304" pitchFamily="18" charset="0"/>
+              </a:rPr>
+              <a:t>A new ghost generation structure was created.</a:t>
+            </a:r>
+            <a:endParaRPr lang="tr-TR" sz="1800" dirty="0">
+              <a:latin typeface="Calibri" panose="020F0502020204030204" pitchFamily="34" charset="0"/>
+              <a:cs typeface="Times New Roman" panose="02020603050405020304" pitchFamily="18" charset="0"/>
+            </a:endParaRPr>
+          </a:p>
+          <a:p>
+            <a:pPr marL="342900" lvl="0" indent="-342900" algn="l">
+              <a:lnSpc>
+                <a:spcPct val="107000"/>
+              </a:lnSpc>
+              <a:spcAft>
+                <a:spcPts val="800"/>
+              </a:spcAft>
+              <a:buFont typeface="Wingdings" panose="05000000000000000000" pitchFamily="2" charset="2"/>
+              <a:buChar char="Ø"/>
+            </a:pPr>
+            <a:r>
+              <a:rPr lang="en-US" sz="1800" dirty="0">
+                <a:latin typeface="Calibri" panose="020F0502020204030204" pitchFamily="34" charset="0"/>
+                <a:cs typeface="Times New Roman" panose="02020603050405020304" pitchFamily="18" charset="0"/>
+              </a:rPr>
+              <a:t>Ghost generation time limit can be determined, and color variety is provided.</a:t>
+            </a:r>
+            <a:endParaRPr lang="tr-TR" sz="1800" dirty="0">
+              <a:latin typeface="Calibri" panose="020F0502020204030204" pitchFamily="34" charset="0"/>
+              <a:cs typeface="Times New Roman" panose="02020603050405020304" pitchFamily="18" charset="0"/>
+            </a:endParaRPr>
+          </a:p>
+          <a:p>
             <a:pPr algn="l"/>
             <a:endParaRPr lang="en-GB" dirty="0">
               <a:latin typeface="Tw Cen MT" panose="020B0602020104020603" pitchFamily="34" charset="0"/>
@@ -7006,6 +7564,177 @@
             <a:normAutofit/>
           </a:bodyPr>
           <a:lstStyle/>
+          <a:p>
+            <a:pPr lvl="1" algn="l"/>
+            <a:r>
+              <a:rPr lang="tr-TR" sz="2400" dirty="0">
+                <a:latin typeface="Tw Cen MT" panose="020B0602020104020603" pitchFamily="34" charset="0"/>
+              </a:rPr>
+              <a:t>Workflow of Tactical-AI</a:t>
+            </a:r>
+          </a:p>
+          <a:p>
+            <a:pPr marL="342900" indent="-342900" algn="l">
+              <a:lnSpc>
+                <a:spcPct val="107000"/>
+              </a:lnSpc>
+              <a:spcAft>
+                <a:spcPts val="800"/>
+              </a:spcAft>
+              <a:buFont typeface="Wingdings" panose="05000000000000000000" pitchFamily="2" charset="2"/>
+              <a:buChar char="Ø"/>
+            </a:pPr>
+            <a:r>
+              <a:rPr lang="en-US" sz="1800" dirty="0">
+                <a:latin typeface="Calibri" panose="020F0502020204030204" pitchFamily="34" charset="0"/>
+                <a:cs typeface="Times New Roman" panose="02020603050405020304" pitchFamily="18" charset="0"/>
+              </a:rPr>
+              <a:t>The sensing mechanism was added. The ghost chases the player by comparing the distance with “Manhattan Distance” and searches for the player while the distance is satisfied.</a:t>
+            </a:r>
+            <a:endParaRPr lang="tr-TR" sz="1800" dirty="0">
+              <a:latin typeface="Calibri" panose="020F0502020204030204" pitchFamily="34" charset="0"/>
+              <a:cs typeface="Times New Roman" panose="02020603050405020304" pitchFamily="18" charset="0"/>
+            </a:endParaRPr>
+          </a:p>
+          <a:p>
+            <a:pPr marL="800100" lvl="1" indent="-342900" algn="l">
+              <a:lnSpc>
+                <a:spcPct val="107000"/>
+              </a:lnSpc>
+              <a:spcAft>
+                <a:spcPts val="800"/>
+              </a:spcAft>
+              <a:buFont typeface="Wingdings" panose="05000000000000000000" pitchFamily="2" charset="2"/>
+              <a:buChar char="Ø"/>
+            </a:pPr>
+            <a:r>
+              <a:rPr lang="en-US" sz="1400" dirty="0">
+                <a:latin typeface="Calibri" panose="020F0502020204030204" pitchFamily="34" charset="0"/>
+                <a:cs typeface="Times New Roman" panose="02020603050405020304" pitchFamily="18" charset="0"/>
+              </a:rPr>
+              <a:t>If the distance score is bigger than 10, the path is selected randomly.</a:t>
+            </a:r>
+            <a:endParaRPr lang="tr-TR" sz="1400" dirty="0">
+              <a:latin typeface="Calibri" panose="020F0502020204030204" pitchFamily="34" charset="0"/>
+              <a:cs typeface="Times New Roman" panose="02020603050405020304" pitchFamily="18" charset="0"/>
+            </a:endParaRPr>
+          </a:p>
+          <a:p>
+            <a:pPr marL="800100" lvl="1" indent="-342900" algn="l">
+              <a:lnSpc>
+                <a:spcPct val="107000"/>
+              </a:lnSpc>
+              <a:spcAft>
+                <a:spcPts val="800"/>
+              </a:spcAft>
+              <a:buFont typeface="Wingdings" panose="05000000000000000000" pitchFamily="2" charset="2"/>
+              <a:buChar char="Ø"/>
+            </a:pPr>
+            <a:r>
+              <a:rPr lang="en-US" sz="1400" dirty="0">
+                <a:latin typeface="Calibri" panose="020F0502020204030204" pitchFamily="34" charset="0"/>
+                <a:cs typeface="Times New Roman" panose="02020603050405020304" pitchFamily="18" charset="0"/>
+              </a:rPr>
+              <a:t>If the distance score is </a:t>
+            </a:r>
+            <a:r>
+              <a:rPr lang="tr-TR" sz="1400" dirty="0">
+                <a:latin typeface="Calibri" panose="020F0502020204030204" pitchFamily="34" charset="0"/>
+                <a:cs typeface="Times New Roman" panose="02020603050405020304" pitchFamily="18" charset="0"/>
+              </a:rPr>
+              <a:t>lower or equal</a:t>
+            </a:r>
+            <a:r>
+              <a:rPr lang="en-US" sz="1400" dirty="0">
+                <a:latin typeface="Calibri" panose="020F0502020204030204" pitchFamily="34" charset="0"/>
+                <a:cs typeface="Times New Roman" panose="02020603050405020304" pitchFamily="18" charset="0"/>
+              </a:rPr>
+              <a:t> </a:t>
+            </a:r>
+            <a:r>
+              <a:rPr lang="tr-TR" sz="1400" dirty="0">
+                <a:latin typeface="Calibri" panose="020F0502020204030204" pitchFamily="34" charset="0"/>
+                <a:cs typeface="Times New Roman" panose="02020603050405020304" pitchFamily="18" charset="0"/>
+              </a:rPr>
+              <a:t>to </a:t>
+            </a:r>
+            <a:r>
+              <a:rPr lang="en-US" sz="1400" dirty="0">
+                <a:latin typeface="Calibri" panose="020F0502020204030204" pitchFamily="34" charset="0"/>
+                <a:cs typeface="Times New Roman" panose="02020603050405020304" pitchFamily="18" charset="0"/>
+              </a:rPr>
+              <a:t>10, </a:t>
+            </a:r>
+            <a:r>
+              <a:rPr lang="tr-TR" sz="1400" dirty="0">
+                <a:latin typeface="Calibri" panose="020F0502020204030204" pitchFamily="34" charset="0"/>
+                <a:cs typeface="Times New Roman" panose="02020603050405020304" pitchFamily="18" charset="0"/>
+              </a:rPr>
+              <a:t>the ghost chases Pac-Man</a:t>
+            </a:r>
+            <a:r>
+              <a:rPr lang="en-US" sz="1400" dirty="0">
+                <a:latin typeface="Calibri" panose="020F0502020204030204" pitchFamily="34" charset="0"/>
+                <a:cs typeface="Times New Roman" panose="02020603050405020304" pitchFamily="18" charset="0"/>
+              </a:rPr>
+              <a:t>.</a:t>
+            </a:r>
+            <a:endParaRPr lang="tr-TR" sz="1400" dirty="0">
+              <a:latin typeface="Calibri" panose="020F0502020204030204" pitchFamily="34" charset="0"/>
+              <a:cs typeface="Times New Roman" panose="02020603050405020304" pitchFamily="18" charset="0"/>
+            </a:endParaRPr>
+          </a:p>
+          <a:p>
+            <a:pPr marL="800100" lvl="1" indent="-342900" algn="l">
+              <a:lnSpc>
+                <a:spcPct val="107000"/>
+              </a:lnSpc>
+              <a:spcAft>
+                <a:spcPts val="800"/>
+              </a:spcAft>
+              <a:buFont typeface="Wingdings" panose="05000000000000000000" pitchFamily="2" charset="2"/>
+              <a:buChar char="Ø"/>
+            </a:pPr>
+            <a:r>
+              <a:rPr lang="tr-TR" sz="1400" dirty="0">
+                <a:latin typeface="Calibri" panose="020F0502020204030204" pitchFamily="34" charset="0"/>
+                <a:cs typeface="Times New Roman" panose="02020603050405020304" pitchFamily="18" charset="0"/>
+              </a:rPr>
+              <a:t>A* Algorithm is for pathfinding purposes.</a:t>
+            </a:r>
+          </a:p>
+          <a:p>
+            <a:pPr marL="342900" lvl="0" indent="-342900" algn="l">
+              <a:lnSpc>
+                <a:spcPct val="107000"/>
+              </a:lnSpc>
+              <a:buFont typeface="Wingdings" panose="05000000000000000000" pitchFamily="2" charset="2"/>
+              <a:buChar char="Ø"/>
+            </a:pPr>
+            <a:r>
+              <a:rPr lang="tr-TR" sz="1800" dirty="0">
+                <a:latin typeface="Calibri" panose="020F0502020204030204" pitchFamily="34" charset="0"/>
+                <a:cs typeface="Times New Roman" panose="02020603050405020304" pitchFamily="18" charset="0"/>
+              </a:rPr>
+              <a:t>Now the ghost can update their paths without reaching pre-determined final points.</a:t>
+            </a:r>
+          </a:p>
+          <a:p>
+            <a:pPr marL="342900" indent="-342900" algn="l">
+              <a:lnSpc>
+                <a:spcPct val="107000"/>
+              </a:lnSpc>
+              <a:spcAft>
+                <a:spcPts val="800"/>
+              </a:spcAft>
+              <a:buFont typeface="Wingdings" panose="05000000000000000000" pitchFamily="2" charset="2"/>
+              <a:buChar char="Ø"/>
+            </a:pPr>
+            <a:endParaRPr lang="tr-TR" sz="1800" dirty="0">
+              <a:latin typeface="Calibri" panose="020F0502020204030204" pitchFamily="34" charset="0"/>
+              <a:cs typeface="Times New Roman" panose="02020603050405020304" pitchFamily="18" charset="0"/>
+            </a:endParaRPr>
+          </a:p>
           <a:p>
             <a:pPr algn="l"/>
             <a:endParaRPr lang="en-GB" sz="2800" dirty="0">

</xml_diff>